<commit_message>
Add calculation of user time on course + codestyle
</commit_message>
<xml_diff>
--- a/docs/2019_OpenEdu_Logs_Analytics_v1.pptx
+++ b/docs/2019_OpenEdu_Logs_Analytics_v1.pptx
@@ -224,7 +224,7 @@
           <a:p>
             <a:fld id="{35A805B6-0F4E-42DF-A938-4EC92862B39D}" type="datetimeFigureOut">
               <a:rPr lang="en-US" smtClean="0"/>
-              <a:t>10/18/2019</a:t>
+              <a:t>10/20/2019</a:t>
             </a:fld>
             <a:endParaRPr lang="en-US"/>
           </a:p>
@@ -1040,7 +1040,7 @@
           <a:p>
             <a:fld id="{03743ED9-F509-45F8-8819-E205096175F1}" type="datetime1">
               <a:rPr lang="ru-RU" smtClean="0"/>
-              <a:t>18.10.2019</a:t>
+              <a:t>20.10.2019</a:t>
             </a:fld>
             <a:endParaRPr lang="ru-RU"/>
           </a:p>
@@ -1440,7 +1440,7 @@
           <a:p>
             <a:fld id="{E4A2555B-2830-487D-B976-85EFCECEF641}" type="datetime1">
               <a:rPr lang="ru-RU" smtClean="0"/>
-              <a:t>18.10.2019</a:t>
+              <a:t>20.10.2019</a:t>
             </a:fld>
             <a:endParaRPr lang="ru-RU"/>
           </a:p>
@@ -1523,7 +1523,7 @@
           <a:p>
             <a:fld id="{E4A2555B-2830-487D-B976-85EFCECEF641}" type="datetime1">
               <a:rPr lang="ru-RU" smtClean="0"/>
-              <a:t>18.10.2019</a:t>
+              <a:t>20.10.2019</a:t>
             </a:fld>
             <a:endParaRPr lang="ru-RU"/>
           </a:p>
@@ -2626,7 +2626,7 @@
           <a:p>
             <a:fld id="{E4A2555B-2830-487D-B976-85EFCECEF641}" type="datetime1">
               <a:rPr lang="ru-RU" smtClean="0"/>
-              <a:t>18.10.2019</a:t>
+              <a:t>20.10.2019</a:t>
             </a:fld>
             <a:endParaRPr lang="ru-RU"/>
           </a:p>
@@ -2863,7 +2863,7 @@
           <a:p>
             <a:fld id="{E4A2555B-2830-487D-B976-85EFCECEF641}" type="datetime1">
               <a:rPr lang="ru-RU" smtClean="0"/>
-              <a:t>18.10.2019</a:t>
+              <a:t>20.10.2019</a:t>
             </a:fld>
             <a:endParaRPr lang="ru-RU"/>
           </a:p>
@@ -3259,7 +3259,7 @@
           <a:p>
             <a:fld id="{E4A2555B-2830-487D-B976-85EFCECEF641}" type="datetime1">
               <a:rPr lang="ru-RU" smtClean="0"/>
-              <a:t>18.10.2019</a:t>
+              <a:t>20.10.2019</a:t>
             </a:fld>
             <a:endParaRPr lang="ru-RU"/>
           </a:p>
@@ -4786,12 +4786,27 @@
               <a:rPr lang="ru-RU" dirty="0"/>
               <a:t>Продолжительность (сек, мин, час, дни, и т.д.)</a:t>
             </a:r>
+            <a:endParaRPr lang="en-US" dirty="0"/>
           </a:p>
           <a:p>
             <a:pPr lvl="1"/>
             <a:r>
               <a:rPr lang="ru-RU" dirty="0"/>
               <a:t>Значение одного из параметров строки лога</a:t>
+            </a:r>
+          </a:p>
+          <a:p>
+            <a:pPr lvl="1"/>
+            <a:r>
+              <a:rPr lang="ru-RU" dirty="0"/>
+              <a:t>Среднее значение</a:t>
+            </a:r>
+          </a:p>
+          <a:p>
+            <a:pPr lvl="1"/>
+            <a:r>
+              <a:rPr lang="ru-RU" dirty="0"/>
+              <a:t>Тип распределения велечины</a:t>
             </a:r>
           </a:p>
         </p:txBody>
@@ -4959,6 +4974,13 @@
             <a:r>
               <a:rPr lang="ru-RU" dirty="0"/>
               <a:t>Подсчет общего количества событий на разделе курса</a:t>
+            </a:r>
+          </a:p>
+          <a:p>
+            <a:pPr lvl="1"/>
+            <a:r>
+              <a:rPr lang="ru-RU" dirty="0"/>
+              <a:t>Подсчет среднего показателя по курсу</a:t>
             </a:r>
           </a:p>
           <a:p>

</xml_diff>

<commit_message>
Analytic task to calculate users who started,but not finished the course
</commit_message>
<xml_diff>
--- a/docs/2019_OpenEdu_Logs_Analytics_v1.pptx
+++ b/docs/2019_OpenEdu_Logs_Analytics_v1.pptx
@@ -224,7 +224,7 @@
           <a:p>
             <a:fld id="{35A805B6-0F4E-42DF-A938-4EC92862B39D}" type="datetimeFigureOut">
               <a:rPr lang="en-US" smtClean="0"/>
-              <a:t>10/20/2019</a:t>
+              <a:t>10/22/2019</a:t>
             </a:fld>
             <a:endParaRPr lang="en-US"/>
           </a:p>
@@ -1040,7 +1040,7 @@
           <a:p>
             <a:fld id="{03743ED9-F509-45F8-8819-E205096175F1}" type="datetime1">
               <a:rPr lang="ru-RU" smtClean="0"/>
-              <a:t>20.10.2019</a:t>
+              <a:t>22.10.2019</a:t>
             </a:fld>
             <a:endParaRPr lang="ru-RU"/>
           </a:p>
@@ -1440,7 +1440,7 @@
           <a:p>
             <a:fld id="{E4A2555B-2830-487D-B976-85EFCECEF641}" type="datetime1">
               <a:rPr lang="ru-RU" smtClean="0"/>
-              <a:t>20.10.2019</a:t>
+              <a:t>22.10.2019</a:t>
             </a:fld>
             <a:endParaRPr lang="ru-RU"/>
           </a:p>
@@ -1523,7 +1523,7 @@
           <a:p>
             <a:fld id="{E4A2555B-2830-487D-B976-85EFCECEF641}" type="datetime1">
               <a:rPr lang="ru-RU" smtClean="0"/>
-              <a:t>20.10.2019</a:t>
+              <a:t>22.10.2019</a:t>
             </a:fld>
             <a:endParaRPr lang="ru-RU"/>
           </a:p>
@@ -2626,7 +2626,7 @@
           <a:p>
             <a:fld id="{E4A2555B-2830-487D-B976-85EFCECEF641}" type="datetime1">
               <a:rPr lang="ru-RU" smtClean="0"/>
-              <a:t>20.10.2019</a:t>
+              <a:t>22.10.2019</a:t>
             </a:fld>
             <a:endParaRPr lang="ru-RU"/>
           </a:p>
@@ -2863,7 +2863,7 @@
           <a:p>
             <a:fld id="{E4A2555B-2830-487D-B976-85EFCECEF641}" type="datetime1">
               <a:rPr lang="ru-RU" smtClean="0"/>
-              <a:t>20.10.2019</a:t>
+              <a:t>22.10.2019</a:t>
             </a:fld>
             <a:endParaRPr lang="ru-RU"/>
           </a:p>
@@ -3259,7 +3259,7 @@
           <a:p>
             <a:fld id="{E4A2555B-2830-487D-B976-85EFCECEF641}" type="datetime1">
               <a:rPr lang="ru-RU" smtClean="0"/>
-              <a:t>20.10.2019</a:t>
+              <a:t>22.10.2019</a:t>
             </a:fld>
             <a:endParaRPr lang="ru-RU"/>
           </a:p>
@@ -5562,6 +5562,65 @@
           <a:p>
             <a:pPr lvl="1"/>
             <a:r>
+              <a:rPr lang="ru-RU" dirty="0">
+                <a:solidFill>
+                  <a:srgbClr val="19B861"/>
+                </a:solidFill>
+              </a:rPr>
+              <a:t>Сколько времени провел студент в общем на курсе</a:t>
+            </a:r>
+            <a:endParaRPr lang="en-US" dirty="0">
+              <a:solidFill>
+                <a:srgbClr val="19B861"/>
+              </a:solidFill>
+            </a:endParaRPr>
+          </a:p>
+          <a:p>
+            <a:pPr lvl="1"/>
+            <a:r>
+              <a:rPr lang="ru-RU" dirty="0">
+                <a:solidFill>
+                  <a:srgbClr val="19B861"/>
+                </a:solidFill>
+              </a:rPr>
+              <a:t>Сколько времени провел студент</a:t>
+            </a:r>
+            <a:r>
+              <a:rPr lang="en-US" dirty="0">
+                <a:solidFill>
+                  <a:srgbClr val="19B861"/>
+                </a:solidFill>
+              </a:rPr>
+              <a:t> </a:t>
+            </a:r>
+            <a:r>
+              <a:rPr lang="ru-RU" dirty="0">
+                <a:solidFill>
+                  <a:srgbClr val="19B861"/>
+                </a:solidFill>
+              </a:rPr>
+              <a:t>на курсе в зависимости от даты</a:t>
+            </a:r>
+            <a:endParaRPr lang="en-US" dirty="0">
+              <a:solidFill>
+                <a:srgbClr val="19B861"/>
+              </a:solidFill>
+            </a:endParaRPr>
+          </a:p>
+          <a:p>
+            <a:pPr lvl="1"/>
+            <a:r>
+              <a:rPr lang="ru-RU" dirty="0">
+                <a:solidFill>
+                  <a:srgbClr val="19B861"/>
+                </a:solidFill>
+              </a:rPr>
+              <a:t>Сколько студентов не приступило к курсу</a:t>
+            </a:r>
+          </a:p>
+          <a:p>
+            <a:pPr lvl="1"/>
+            <a:r>
               <a:rPr lang="ru-RU" dirty="0"/>
               <a:t>Сколько времени провел студент на элементе</a:t>
             </a:r>
@@ -5570,21 +5629,7 @@
             <a:pPr lvl="1"/>
             <a:r>
               <a:rPr lang="ru-RU" dirty="0"/>
-              <a:t>Сколько времени провел студент в общем на курсе</a:t>
-            </a:r>
-          </a:p>
-          <a:p>
-            <a:pPr lvl="1"/>
-            <a:r>
-              <a:rPr lang="ru-RU" dirty="0"/>
               <a:t>Какие вопросы оказались сложными(потратили много времени/плохо сдали)</a:t>
-            </a:r>
-          </a:p>
-          <a:p>
-            <a:pPr lvl="1"/>
-            <a:r>
-              <a:rPr lang="ru-RU" dirty="0"/>
-              <a:t>Сколько студентов не приступило к курсу</a:t>
             </a:r>
           </a:p>
           <a:p>

</xml_diff>

<commit_message>
Adopt task to calculate users activity on course
</commit_message>
<xml_diff>
--- a/docs/2019_OpenEdu_Logs_Analytics_v1.pptx
+++ b/docs/2019_OpenEdu_Logs_Analytics_v1.pptx
@@ -5551,7 +5551,9 @@
         </p:nvSpPr>
         <p:spPr/>
         <p:txBody>
-          <a:bodyPr/>
+          <a:bodyPr>
+            <a:normAutofit/>
+          </a:bodyPr>
           <a:lstStyle/>
           <a:p>
             <a:r>
@@ -5615,12 +5617,96 @@
                   <a:srgbClr val="19B861"/>
                 </a:solidFill>
               </a:rPr>
-              <a:t>Сколько студентов не приступило к курсу</a:t>
-            </a:r>
+              <a:t>Какие студенты не приступили к курсу</a:t>
+            </a:r>
+            <a:r>
+              <a:rPr lang="en-US" dirty="0">
+                <a:solidFill>
+                  <a:srgbClr val="19B861"/>
+                </a:solidFill>
+              </a:rPr>
+              <a:t> (</a:t>
+            </a:r>
+            <a:r>
+              <a:rPr lang="ru-RU" dirty="0">
+                <a:solidFill>
+                  <a:srgbClr val="19B861"/>
+                </a:solidFill>
+              </a:rPr>
+              <a:t>и сколько)</a:t>
+            </a:r>
+            <a:endParaRPr lang="en-US" dirty="0">
+              <a:solidFill>
+                <a:srgbClr val="19B861"/>
+              </a:solidFill>
+            </a:endParaRPr>
           </a:p>
           <a:p>
             <a:pPr lvl="1"/>
             <a:r>
+              <a:rPr lang="ru-RU" dirty="0">
+                <a:solidFill>
+                  <a:srgbClr val="19B861"/>
+                </a:solidFill>
+              </a:rPr>
+              <a:t>Какие студенты приступили к курсу, но не закончили (и сколько)</a:t>
+            </a:r>
+          </a:p>
+          <a:p>
+            <a:pPr lvl="1"/>
+            <a:r>
+              <a:rPr lang="ru-RU" dirty="0">
+                <a:solidFill>
+                  <a:srgbClr val="19B861"/>
+                </a:solidFill>
+              </a:rPr>
+              <a:t>Что пользователь</a:t>
+            </a:r>
+            <a:r>
+              <a:rPr lang="en-US" dirty="0">
+                <a:solidFill>
+                  <a:srgbClr val="19B861"/>
+                </a:solidFill>
+              </a:rPr>
+              <a:t> (</a:t>
+            </a:r>
+            <a:r>
+              <a:rPr lang="ru-RU" dirty="0">
+                <a:solidFill>
+                  <a:srgbClr val="19B861"/>
+                </a:solidFill>
+              </a:rPr>
+              <a:t>или все пользователи) делал на курсе в зависимости от времени </a:t>
+            </a:r>
+            <a:r>
+              <a:rPr lang="ru-RU">
+                <a:solidFill>
+                  <a:srgbClr val="19B861"/>
+                </a:solidFill>
+              </a:rPr>
+              <a:t>курса (Количественный анализ </a:t>
+            </a:r>
+            <a:r>
+              <a:rPr lang="ru-RU" dirty="0">
+                <a:solidFill>
+                  <a:srgbClr val="19B861"/>
+                </a:solidFill>
+              </a:rPr>
+              <a:t>активности пользователя и преподавателя курса</a:t>
+            </a:r>
+            <a:r>
+              <a:rPr lang="ru-RU" dirty="0"/>
+              <a:t>)</a:t>
+            </a:r>
+            <a:endParaRPr lang="ru-RU" dirty="0">
+              <a:solidFill>
+                <a:srgbClr val="19B861"/>
+              </a:solidFill>
+            </a:endParaRPr>
+          </a:p>
+          <a:p>
+            <a:pPr lvl="1"/>
+            <a:r>
               <a:rPr lang="ru-RU" dirty="0"/>
               <a:t>Сколько времени провел студент на элементе</a:t>
             </a:r>
@@ -5633,23 +5719,23 @@
             </a:r>
           </a:p>
           <a:p>
+            <a:r>
+              <a:rPr lang="ru-RU" dirty="0"/>
+              <a:t>Трехмерные показатели</a:t>
+            </a:r>
+          </a:p>
+          <a:p>
             <a:pPr lvl="1"/>
             <a:r>
               <a:rPr lang="ru-RU" dirty="0"/>
-              <a:t>Сколько присупило и не закончило</a:t>
-            </a:r>
-          </a:p>
-          <a:p>
-            <a:r>
-              <a:rPr lang="ru-RU" dirty="0"/>
-              <a:t>Трехмерные показатели</a:t>
+              <a:t>Сколько времени смотрят видео в зависимости от даты на курсе</a:t>
             </a:r>
           </a:p>
           <a:p>
             <a:pPr lvl="1"/>
             <a:r>
               <a:rPr lang="ru-RU" dirty="0"/>
-              <a:t>Сколько времени смотрят видео в зависимости от даты на курсе</a:t>
+              <a:t>Что пользователь делал на курсе в зависимости от времени курса.</a:t>
             </a:r>
           </a:p>
         </p:txBody>
@@ -5765,7 +5851,7 @@
         </p:spPr>
         <p:txBody>
           <a:bodyPr>
-            <a:normAutofit fontScale="77500" lnSpcReduction="20000"/>
+            <a:normAutofit fontScale="85000" lnSpcReduction="20000"/>
           </a:bodyPr>
           <a:lstStyle/>
           <a:p>
@@ -5774,7 +5860,28 @@
             </a:pPr>
             <a:r>
               <a:rPr lang="ru-RU" dirty="0"/>
-              <a:t>1. Анализ активности пользователя и преподавателя курса</a:t>
+              <a:t>1. Карта активности на курсе</a:t>
+            </a:r>
+          </a:p>
+          <a:p>
+            <a:pPr lvl="1"/>
+            <a:r>
+              <a:rPr lang="ru-RU" dirty="0"/>
+              <a:t>Подразумевается как пользователь перемещался по разделам курса. </a:t>
+            </a:r>
+          </a:p>
+          <a:p>
+            <a:pPr lvl="1"/>
+            <a:r>
+              <a:rPr lang="ru-RU" dirty="0"/>
+              <a:t>По каждому пользователю должен быть построен граф перемещения по разделам. В узлах графа раздел, переходы между узлами - перемещения. Переходы должны быть подписаны порядковым номером перехода. </a:t>
+            </a:r>
+          </a:p>
+          <a:p>
+            <a:pPr lvl="1"/>
+            <a:r>
+              <a:rPr lang="ru-RU" dirty="0"/>
+              <a:t>Итоговый вид - табличка в csv, которая потом может быть подана на блок визуализации и построения графа. </a:t>
             </a:r>
           </a:p>
           <a:p>
@@ -5783,28 +5890,14 @@
             </a:pPr>
             <a:r>
               <a:rPr lang="ru-RU" dirty="0"/>
-              <a:t>2. Карта активности на курсе</a:t>
+              <a:t>2. Определение махинаций студентов </a:t>
             </a:r>
           </a:p>
           <a:p>
             <a:pPr lvl="1"/>
             <a:r>
               <a:rPr lang="ru-RU" dirty="0"/>
-              <a:t>Подразумевается как пользователь перемещался по разделам курса. </a:t>
-            </a:r>
-          </a:p>
-          <a:p>
-            <a:pPr lvl="1"/>
-            <a:r>
-              <a:rPr lang="ru-RU" dirty="0"/>
-              <a:t>По каждому пользователю должен быть построен граф перемещения по разделам. В узлах графа раздел, переходы между узлами - перемещения. Переходы должны быть подписаны порядковым номером перехода. </a:t>
-            </a:r>
-          </a:p>
-          <a:p>
-            <a:pPr lvl="1"/>
-            <a:r>
-              <a:rPr lang="ru-RU" dirty="0"/>
-              <a:t>Итоговый вид - табличка в csv, которая потом может быть подана на блок визуализации и построения графа. </a:t>
+              <a:t>Например, время нахождения на тесте 1 мин, или время просмотра всех видеолекций 1 мин, или наоборот человек уснул на просмотре видео.</a:t>
             </a:r>
           </a:p>
           <a:p>
@@ -5813,14 +5906,14 @@
             </a:pPr>
             <a:r>
               <a:rPr lang="ru-RU" dirty="0"/>
-              <a:t>3. Определение махинаций студентов </a:t>
+              <a:t>3. Прогнозирование поведения студента на курсе.</a:t>
             </a:r>
           </a:p>
           <a:p>
             <a:pPr lvl="1"/>
             <a:r>
               <a:rPr lang="ru-RU" dirty="0"/>
-              <a:t>Например, время нахождения на тесте 1 мин, или время просмотра всех видеолекций 1 мин, или наоборот человек уснул на просмотре видео.</a:t>
+              <a:t>Сможет ли этот пользователь завершит курс или он на него зарегистрировался просто так.</a:t>
             </a:r>
           </a:p>
           <a:p>
@@ -5829,14 +5922,14 @@
             </a:pPr>
             <a:r>
               <a:rPr lang="ru-RU" dirty="0"/>
-              <a:t>4. Прогнозирование поведения студента на курсе.</a:t>
+              <a:t>4. Определение наиболее интересного материала курса и материала курса, который стоит переработать, доработать</a:t>
             </a:r>
           </a:p>
           <a:p>
             <a:pPr lvl="1"/>
             <a:r>
               <a:rPr lang="ru-RU" dirty="0"/>
-              <a:t>Сможет ли этот пользователь завершит курс или он на него зарегистрировался просто так.</a:t>
+              <a:t>Наиболее плохие вопросы в тестах, по которым у пользователей возникает больше всего вопросов. </a:t>
             </a:r>
           </a:p>
           <a:p>
@@ -5845,23 +5938,7 @@
             </a:pPr>
             <a:r>
               <a:rPr lang="ru-RU" dirty="0"/>
-              <a:t>5. Определение наиболее интересного материала курса и материала курса, который стоит переработать, доработать</a:t>
-            </a:r>
-          </a:p>
-          <a:p>
-            <a:pPr lvl="1"/>
-            <a:r>
-              <a:rPr lang="ru-RU" dirty="0"/>
-              <a:t>Наиболее плохие вопросы в тестах, по которым у пользователей возникает больше всего вопросов. </a:t>
-            </a:r>
-          </a:p>
-          <a:p>
-            <a:pPr marL="0" indent="0">
-              <a:buNone/>
-            </a:pPr>
-            <a:r>
-              <a:rPr lang="ru-RU" dirty="0"/>
-              <a:t>6. Сравнение результатов запуска курса из года в год</a:t>
+              <a:t>5. Сравнение результатов запуска курса из года в год</a:t>
             </a:r>
           </a:p>
         </p:txBody>

</xml_diff>

<commit_message>
Add analytics to build user way of moving over course pages
</commit_message>
<xml_diff>
--- a/docs/2019_OpenEdu_Logs_Analytics_v1.pptx
+++ b/docs/2019_OpenEdu_Logs_Analytics_v1.pptx
@@ -224,7 +224,7 @@
           <a:p>
             <a:fld id="{35A805B6-0F4E-42DF-A938-4EC92862B39D}" type="datetimeFigureOut">
               <a:rPr lang="en-US" smtClean="0"/>
-              <a:t>10/22/2019</a:t>
+              <a:t>10/23/2019</a:t>
             </a:fld>
             <a:endParaRPr lang="en-US"/>
           </a:p>
@@ -1040,7 +1040,7 @@
           <a:p>
             <a:fld id="{03743ED9-F509-45F8-8819-E205096175F1}" type="datetime1">
               <a:rPr lang="ru-RU" smtClean="0"/>
-              <a:t>22.10.2019</a:t>
+              <a:t>23.10.2019</a:t>
             </a:fld>
             <a:endParaRPr lang="ru-RU"/>
           </a:p>
@@ -1440,7 +1440,7 @@
           <a:p>
             <a:fld id="{E4A2555B-2830-487D-B976-85EFCECEF641}" type="datetime1">
               <a:rPr lang="ru-RU" smtClean="0"/>
-              <a:t>22.10.2019</a:t>
+              <a:t>23.10.2019</a:t>
             </a:fld>
             <a:endParaRPr lang="ru-RU"/>
           </a:p>
@@ -1523,7 +1523,7 @@
           <a:p>
             <a:fld id="{E4A2555B-2830-487D-B976-85EFCECEF641}" type="datetime1">
               <a:rPr lang="ru-RU" smtClean="0"/>
-              <a:t>22.10.2019</a:t>
+              <a:t>23.10.2019</a:t>
             </a:fld>
             <a:endParaRPr lang="ru-RU"/>
           </a:p>
@@ -2626,7 +2626,7 @@
           <a:p>
             <a:fld id="{E4A2555B-2830-487D-B976-85EFCECEF641}" type="datetime1">
               <a:rPr lang="ru-RU" smtClean="0"/>
-              <a:t>22.10.2019</a:t>
+              <a:t>23.10.2019</a:t>
             </a:fld>
             <a:endParaRPr lang="ru-RU"/>
           </a:p>
@@ -2863,7 +2863,7 @@
           <a:p>
             <a:fld id="{E4A2555B-2830-487D-B976-85EFCECEF641}" type="datetime1">
               <a:rPr lang="ru-RU" smtClean="0"/>
-              <a:t>22.10.2019</a:t>
+              <a:t>23.10.2019</a:t>
             </a:fld>
             <a:endParaRPr lang="ru-RU"/>
           </a:p>
@@ -3259,7 +3259,7 @@
           <a:p>
             <a:fld id="{E4A2555B-2830-487D-B976-85EFCECEF641}" type="datetime1">
               <a:rPr lang="ru-RU" smtClean="0"/>
-              <a:t>22.10.2019</a:t>
+              <a:t>23.10.2019</a:t>
             </a:fld>
             <a:endParaRPr lang="ru-RU"/>
           </a:p>
@@ -5655,6 +5655,33 @@
           <a:p>
             <a:pPr lvl="1"/>
             <a:r>
+              <a:rPr lang="ru-RU" dirty="0"/>
+              <a:t>Сколько времени провел студент на элементе</a:t>
+            </a:r>
+          </a:p>
+          <a:p>
+            <a:pPr lvl="1"/>
+            <a:r>
+              <a:rPr lang="ru-RU" dirty="0"/>
+              <a:t>Какие вопросы оказались сложными(потратили много времени/плохо сдали)</a:t>
+            </a:r>
+          </a:p>
+          <a:p>
+            <a:r>
+              <a:rPr lang="ru-RU" dirty="0"/>
+              <a:t>Трехмерные показатели</a:t>
+            </a:r>
+          </a:p>
+          <a:p>
+            <a:pPr lvl="1"/>
+            <a:r>
+              <a:rPr lang="ru-RU" dirty="0"/>
+              <a:t>Сколько времени смотрят видео в зависимости от даты на курсе</a:t>
+            </a:r>
+          </a:p>
+          <a:p>
+            <a:pPr lvl="1"/>
+            <a:r>
               <a:rPr lang="ru-RU" dirty="0">
                 <a:solidFill>
                   <a:srgbClr val="19B861"/>
@@ -5676,66 +5703,23 @@
                   <a:srgbClr val="19B861"/>
                 </a:solidFill>
               </a:rPr>
-              <a:t>или все пользователи) делал на курсе в зависимости от времени </a:t>
-            </a:r>
-            <a:r>
-              <a:rPr lang="ru-RU">
-                <a:solidFill>
-                  <a:srgbClr val="19B861"/>
-                </a:solidFill>
-              </a:rPr>
-              <a:t>курса (Количественный анализ </a:t>
-            </a:r>
+              <a:t>или все пользователи) делал на курсе в зависимости от времени курса (Количественный анализ активности пользователя и преподавателя курса</a:t>
+            </a:r>
+            <a:r>
+              <a:rPr lang="ru-RU" dirty="0"/>
+              <a:t>)</a:t>
+            </a:r>
+            <a:endParaRPr lang="en-US" dirty="0"/>
+          </a:p>
+          <a:p>
+            <a:pPr lvl="1"/>
             <a:r>
               <a:rPr lang="ru-RU" dirty="0">
                 <a:solidFill>
                   <a:srgbClr val="19B861"/>
                 </a:solidFill>
               </a:rPr>
-              <a:t>активности пользователя и преподавателя курса</a:t>
-            </a:r>
-            <a:r>
-              <a:rPr lang="ru-RU" dirty="0"/>
-              <a:t>)</a:t>
-            </a:r>
-            <a:endParaRPr lang="ru-RU" dirty="0">
-              <a:solidFill>
-                <a:srgbClr val="19B861"/>
-              </a:solidFill>
-            </a:endParaRPr>
-          </a:p>
-          <a:p>
-            <a:pPr lvl="1"/>
-            <a:r>
-              <a:rPr lang="ru-RU" dirty="0"/>
-              <a:t>Сколько времени провел студент на элементе</a:t>
-            </a:r>
-          </a:p>
-          <a:p>
-            <a:pPr lvl="1"/>
-            <a:r>
-              <a:rPr lang="ru-RU" dirty="0"/>
-              <a:t>Какие вопросы оказались сложными(потратили много времени/плохо сдали)</a:t>
-            </a:r>
-          </a:p>
-          <a:p>
-            <a:r>
-              <a:rPr lang="ru-RU" dirty="0"/>
-              <a:t>Трехмерные показатели</a:t>
-            </a:r>
-          </a:p>
-          <a:p>
-            <a:pPr lvl="1"/>
-            <a:r>
-              <a:rPr lang="ru-RU" dirty="0"/>
-              <a:t>Сколько времени смотрят видео в зависимости от даты на курсе</a:t>
-            </a:r>
-          </a:p>
-          <a:p>
-            <a:pPr lvl="1"/>
-            <a:r>
-              <a:rPr lang="ru-RU" dirty="0"/>
-              <a:t>Что пользователь делал на курсе в зависимости от времени курса.</a:t>
+              <a:t>Как перемещался пользователь по страницам курса в зависимости от даты</a:t>
             </a:r>
           </a:p>
         </p:txBody>

</xml_diff>